<commit_message>
Updated some of the stuff in the slide itself.
</commit_message>
<xml_diff>
--- a/2025/Slides/Techbash 2025 - Dark Slide.pptx
+++ b/2025/Slides/Techbash 2025 - Dark Slide.pptx
@@ -496,7 +496,7 @@
           <a:p>
             <a:fld id="{846CE7D5-CF57-46EF-B807-FDD0502418D4}" type="datetimeFigureOut">
               <a:rPr lang="en-US" smtClean="0"/>
-              <a:t>12/20/2024</a:t>
+              <a:t>3/11/2025</a:t>
             </a:fld>
             <a:endParaRPr lang="en-US"/>
           </a:p>
@@ -666,7 +666,7 @@
           <a:p>
             <a:fld id="{846CE7D5-CF57-46EF-B807-FDD0502418D4}" type="datetimeFigureOut">
               <a:rPr lang="en-US" smtClean="0"/>
-              <a:t>12/20/2024</a:t>
+              <a:t>3/11/2025</a:t>
             </a:fld>
             <a:endParaRPr lang="en-US"/>
           </a:p>
@@ -846,7 +846,7 @@
           <a:p>
             <a:fld id="{846CE7D5-CF57-46EF-B807-FDD0502418D4}" type="datetimeFigureOut">
               <a:rPr lang="en-US" smtClean="0"/>
-              <a:t>12/20/2024</a:t>
+              <a:t>3/11/2025</a:t>
             </a:fld>
             <a:endParaRPr lang="en-US"/>
           </a:p>
@@ -1016,7 +1016,7 @@
           <a:p>
             <a:fld id="{846CE7D5-CF57-46EF-B807-FDD0502418D4}" type="datetimeFigureOut">
               <a:rPr lang="en-US" smtClean="0"/>
-              <a:t>12/20/2024</a:t>
+              <a:t>3/11/2025</a:t>
             </a:fld>
             <a:endParaRPr lang="en-US"/>
           </a:p>
@@ -1262,7 +1262,7 @@
           <a:p>
             <a:fld id="{846CE7D5-CF57-46EF-B807-FDD0502418D4}" type="datetimeFigureOut">
               <a:rPr lang="en-US" smtClean="0"/>
-              <a:t>12/20/2024</a:t>
+              <a:t>3/11/2025</a:t>
             </a:fld>
             <a:endParaRPr lang="en-US"/>
           </a:p>
@@ -1494,7 +1494,7 @@
           <a:p>
             <a:fld id="{846CE7D5-CF57-46EF-B807-FDD0502418D4}" type="datetimeFigureOut">
               <a:rPr lang="en-US" smtClean="0"/>
-              <a:t>12/20/2024</a:t>
+              <a:t>3/11/2025</a:t>
             </a:fld>
             <a:endParaRPr lang="en-US"/>
           </a:p>
@@ -1861,7 +1861,7 @@
           <a:p>
             <a:fld id="{846CE7D5-CF57-46EF-B807-FDD0502418D4}" type="datetimeFigureOut">
               <a:rPr lang="en-US" smtClean="0"/>
-              <a:t>12/20/2024</a:t>
+              <a:t>3/11/2025</a:t>
             </a:fld>
             <a:endParaRPr lang="en-US"/>
           </a:p>
@@ -1979,7 +1979,7 @@
           <a:p>
             <a:fld id="{846CE7D5-CF57-46EF-B807-FDD0502418D4}" type="datetimeFigureOut">
               <a:rPr lang="en-US" smtClean="0"/>
-              <a:t>12/20/2024</a:t>
+              <a:t>3/11/2025</a:t>
             </a:fld>
             <a:endParaRPr lang="en-US"/>
           </a:p>
@@ -2074,7 +2074,7 @@
           <a:p>
             <a:fld id="{846CE7D5-CF57-46EF-B807-FDD0502418D4}" type="datetimeFigureOut">
               <a:rPr lang="en-US" smtClean="0"/>
-              <a:t>12/20/2024</a:t>
+              <a:t>3/11/2025</a:t>
             </a:fld>
             <a:endParaRPr lang="en-US"/>
           </a:p>
@@ -2351,7 +2351,7 @@
           <a:p>
             <a:fld id="{846CE7D5-CF57-46EF-B807-FDD0502418D4}" type="datetimeFigureOut">
               <a:rPr lang="en-US" smtClean="0"/>
-              <a:t>12/20/2024</a:t>
+              <a:t>3/11/2025</a:t>
             </a:fld>
             <a:endParaRPr lang="en-US"/>
           </a:p>
@@ -2608,7 +2608,7 @@
           <a:p>
             <a:fld id="{846CE7D5-CF57-46EF-B807-FDD0502418D4}" type="datetimeFigureOut">
               <a:rPr lang="en-US" smtClean="0"/>
-              <a:t>12/20/2024</a:t>
+              <a:t>3/11/2025</a:t>
             </a:fld>
             <a:endParaRPr lang="en-US"/>
           </a:p>
@@ -2821,7 +2821,7 @@
           <a:p>
             <a:fld id="{846CE7D5-CF57-46EF-B807-FDD0502418D4}" type="datetimeFigureOut">
               <a:rPr lang="en-US" smtClean="0"/>
-              <a:t>12/20/2024</a:t>
+              <a:t>3/11/2025</a:t>
             </a:fld>
             <a:endParaRPr lang="en-US"/>
           </a:p>
@@ -3450,8 +3450,27 @@
                 <a:ea typeface="Source Sans Pro"/>
                 <a:cs typeface="Arial"/>
               </a:rPr>
-              <a:t>         - 3-day conference plus lodging for ~$1000 </a:t>
-            </a:r>
+              <a:t>         - 3-day conference plus lodging </a:t>
+            </a:r>
+            <a:r>
+              <a:rPr lang="en-US" sz="2200">
+                <a:solidFill>
+                  <a:srgbClr val="121921"/>
+                </a:solidFill>
+                <a:latin typeface="Source Sans Pro"/>
+                <a:ea typeface="Source Sans Pro"/>
+                <a:cs typeface="Arial"/>
+              </a:rPr>
+              <a:t>for less than $1500 </a:t>
+            </a:r>
+            <a:endParaRPr lang="en-US" sz="2200" dirty="0">
+              <a:solidFill>
+                <a:srgbClr val="121921"/>
+              </a:solidFill>
+              <a:latin typeface="Source Sans Pro"/>
+              <a:ea typeface="Source Sans Pro"/>
+              <a:cs typeface="Arial"/>
+            </a:endParaRPr>
           </a:p>
           <a:p>
             <a:pPr marL="342900" indent="-342900">
@@ -4118,6 +4137,15 @@
 </file>
 
 <file path=customXml/item1.xml><?xml version="1.0" encoding="utf-8"?>
+<?mso-contentType ?>
+<FormTemplates xmlns="http://schemas.microsoft.com/sharepoint/v3/contenttype/forms">
+  <Display>DocumentLibraryForm</Display>
+  <Edit>DocumentLibraryForm</Edit>
+  <New>DocumentLibraryForm</New>
+</FormTemplates>
+</file>
+
+<file path=customXml/item2.xml><?xml version="1.0" encoding="utf-8"?>
 <ct:contentTypeSchema xmlns:ct="http://schemas.microsoft.com/office/2006/metadata/contentType" xmlns:ma="http://schemas.microsoft.com/office/2006/metadata/properties/metaAttributes" ct:_="" ma:_="" ma:contentTypeName="Document" ma:contentTypeID="0x010100B80A5F181A57D04B851B5B9949762B98" ma:contentTypeVersion="16" ma:contentTypeDescription="Create a new document." ma:contentTypeScope="" ma:versionID="692beacaebcd455584ede111235fb0a1">
   <xsd:schema xmlns:xsd="http://www.w3.org/2001/XMLSchema" xmlns:xs="http://www.w3.org/2001/XMLSchema" xmlns:p="http://schemas.microsoft.com/office/2006/metadata/properties" xmlns:ns2="5d6f83c8-2d82-4d6b-ac82-2d841bcaa059" xmlns:ns3="bdb67740-1632-434d-aee7-44a685137151" targetNamespace="http://schemas.microsoft.com/office/2006/metadata/properties" ma:root="true" ma:fieldsID="ec83b577e049f8499bb2e9c3bde541fb" ns2:_="" ns3:_="">
     <xsd:import namespace="5d6f83c8-2d82-4d6b-ac82-2d841bcaa059"/>
@@ -4344,7 +4372,7 @@
 </ct:contentTypeSchema>
 </file>
 
-<file path=customXml/item2.xml><?xml version="1.0" encoding="utf-8"?>
+<file path=customXml/item3.xml><?xml version="1.0" encoding="utf-8"?>
 <p:properties xmlns:p="http://schemas.microsoft.com/office/2006/metadata/properties" xmlns:xsi="http://www.w3.org/2001/XMLSchema-instance" xmlns:pc="http://schemas.microsoft.com/office/infopath/2007/PartnerControls">
   <documentManagement>
     <lcf76f155ced4ddcb4097134ff3c332f xmlns="5d6f83c8-2d82-4d6b-ac82-2d841bcaa059">
@@ -4355,16 +4383,15 @@
 </p:properties>
 </file>
 
-<file path=customXml/item3.xml><?xml version="1.0" encoding="utf-8"?>
-<?mso-contentType ?>
-<FormTemplates xmlns="http://schemas.microsoft.com/sharepoint/v3/contenttype/forms">
-  <Display>DocumentLibraryForm</Display>
-  <Edit>DocumentLibraryForm</Edit>
-  <New>DocumentLibraryForm</New>
-</FormTemplates>
+<file path=customXml/itemProps1.xml><?xml version="1.0" encoding="utf-8"?>
+<ds:datastoreItem xmlns:ds="http://schemas.openxmlformats.org/officeDocument/2006/customXml" ds:itemID="{D1C9E47E-FBCC-4C37-95FB-BAE9766DCA46}">
+  <ds:schemaRefs>
+    <ds:schemaRef ds:uri="http://schemas.microsoft.com/sharepoint/v3/contenttype/forms"/>
+  </ds:schemaRefs>
+</ds:datastoreItem>
 </file>
 
-<file path=customXml/itemProps1.xml><?xml version="1.0" encoding="utf-8"?>
+<file path=customXml/itemProps2.xml><?xml version="1.0" encoding="utf-8"?>
 <ds:datastoreItem xmlns:ds="http://schemas.openxmlformats.org/officeDocument/2006/customXml" ds:itemID="{C07E3697-25B5-4354-B8EA-D62BB85134B9}">
   <ds:schemaRefs>
     <ds:schemaRef ds:uri="http://schemas.microsoft.com/office/2006/metadata/contentType"/>
@@ -4383,7 +4410,7 @@
 </ds:datastoreItem>
 </file>
 
-<file path=customXml/itemProps2.xml><?xml version="1.0" encoding="utf-8"?>
+<file path=customXml/itemProps3.xml><?xml version="1.0" encoding="utf-8"?>
 <ds:datastoreItem xmlns:ds="http://schemas.openxmlformats.org/officeDocument/2006/customXml" ds:itemID="{3CBEFB0F-4CF2-4601-9584-44A13209BB8D}">
   <ds:schemaRefs>
     <ds:schemaRef ds:uri="http://schemas.microsoft.com/office/2006/metadata/properties"/>
@@ -4392,12 +4419,4 @@
     <ds:schemaRef ds:uri="bdb67740-1632-434d-aee7-44a685137151"/>
   </ds:schemaRefs>
 </ds:datastoreItem>
-</file>
-
-<file path=customXml/itemProps3.xml><?xml version="1.0" encoding="utf-8"?>
-<ds:datastoreItem xmlns:ds="http://schemas.openxmlformats.org/officeDocument/2006/customXml" ds:itemID="{D1C9E47E-FBCC-4C37-95FB-BAE9766DCA46}">
-  <ds:schemaRefs>
-    <ds:schemaRef ds:uri="http://schemas.microsoft.com/sharepoint/v3/contenttype/forms"/>
-  </ds:schemaRefs>
-</ds:datastoreItem>
 </file>
</xml_diff>